<commit_message>
Add day 4 slides
</commit_message>
<xml_diff>
--- a/docs/slides/03-IAP25-Day3.pptx
+++ b/docs/slides/03-IAP25-Day3.pptx
@@ -5,7 +5,7 @@
     <p:sldMasterId id="2147483689" r:id="rId1"/>
   </p:sldMasterIdLst>
   <p:notesMasterIdLst>
-    <p:notesMasterId r:id="rId19"/>
+    <p:notesMasterId r:id="rId20"/>
   </p:notesMasterIdLst>
   <p:sldIdLst>
     <p:sldId id="256" r:id="rId2"/>
@@ -23,8 +23,9 @@
     <p:sldId id="409" r:id="rId14"/>
     <p:sldId id="410" r:id="rId15"/>
     <p:sldId id="404" r:id="rId16"/>
-    <p:sldId id="987" r:id="rId17"/>
-    <p:sldId id="393" r:id="rId18"/>
+    <p:sldId id="988" r:id="rId17"/>
+    <p:sldId id="987" r:id="rId18"/>
+    <p:sldId id="393" r:id="rId19"/>
   </p:sldIdLst>
   <p:sldSz cx="12192000" cy="6858000"/>
   <p:notesSz cx="6858000" cy="9144000"/>
@@ -899,6 +900,117 @@
     <p:extLst>
       <p:ext uri="{BB962C8B-B14F-4D97-AF65-F5344CB8AC3E}">
         <p14:creationId xmlns:p14="http://schemas.microsoft.com/office/powerpoint/2010/main" val="261396345"/>
+      </p:ext>
+    </p:extLst>
+  </p:cSld>
+  <p:clrMapOvr>
+    <a:masterClrMapping/>
+  </p:clrMapOvr>
+</p:notes>
+</file>
+
+<file path=ppt/notesSlides/notesSlide13.xml><?xml version="1.0" encoding="utf-8"?>
+<p:notes xmlns:a="http://schemas.openxmlformats.org/drawingml/2006/main" xmlns:r="http://schemas.openxmlformats.org/officeDocument/2006/relationships" xmlns:p="http://schemas.openxmlformats.org/presentationml/2006/main">
+  <p:cSld>
+    <p:spTree>
+      <p:nvGrpSpPr>
+        <p:cNvPr id="1" name="">
+          <a:extLst>
+            <a:ext uri="{FF2B5EF4-FFF2-40B4-BE49-F238E27FC236}">
+              <a16:creationId xmlns:a16="http://schemas.microsoft.com/office/drawing/2014/main" id="{892A9421-6ED8-CF39-C0B9-8742568F276C}"/>
+            </a:ext>
+          </a:extLst>
+        </p:cNvPr>
+        <p:cNvGrpSpPr/>
+        <p:nvPr/>
+      </p:nvGrpSpPr>
+      <p:grpSpPr>
+        <a:xfrm>
+          <a:off x="0" y="0"/>
+          <a:ext cx="0" cy="0"/>
+          <a:chOff x="0" y="0"/>
+          <a:chExt cx="0" cy="0"/>
+        </a:xfrm>
+      </p:grpSpPr>
+      <p:sp>
+        <p:nvSpPr>
+          <p:cNvPr id="2" name="Slide Image Placeholder 1">
+            <a:extLst>
+              <a:ext uri="{FF2B5EF4-FFF2-40B4-BE49-F238E27FC236}">
+                <a16:creationId xmlns:a16="http://schemas.microsoft.com/office/drawing/2014/main" id="{040C2A89-7D7A-2E9E-601B-71480F91AFB9}"/>
+              </a:ext>
+            </a:extLst>
+          </p:cNvPr>
+          <p:cNvSpPr>
+            <a:spLocks noGrp="1" noRot="1" noChangeAspect="1"/>
+          </p:cNvSpPr>
+          <p:nvPr>
+            <p:ph type="sldImg"/>
+          </p:nvPr>
+        </p:nvSpPr>
+        <p:spPr/>
+      </p:sp>
+      <p:sp>
+        <p:nvSpPr>
+          <p:cNvPr id="3" name="Notes Placeholder 2">
+            <a:extLst>
+              <a:ext uri="{FF2B5EF4-FFF2-40B4-BE49-F238E27FC236}">
+                <a16:creationId xmlns:a16="http://schemas.microsoft.com/office/drawing/2014/main" id="{97CDC87F-8827-B69A-4081-5603D2274765}"/>
+              </a:ext>
+            </a:extLst>
+          </p:cNvPr>
+          <p:cNvSpPr>
+            <a:spLocks noGrp="1"/>
+          </p:cNvSpPr>
+          <p:nvPr>
+            <p:ph type="body" idx="1"/>
+          </p:nvPr>
+        </p:nvSpPr>
+        <p:spPr/>
+        <p:txBody>
+          <a:bodyPr/>
+          <a:lstStyle/>
+          <a:p>
+            <a:r>
+              <a:rPr lang="en-US" dirty="0"/>
+              <a:t>How could we do overall world count?</a:t>
+            </a:r>
+          </a:p>
+        </p:txBody>
+      </p:sp>
+      <p:sp>
+        <p:nvSpPr>
+          <p:cNvPr id="4" name="Slide Number Placeholder 3">
+            <a:extLst>
+              <a:ext uri="{FF2B5EF4-FFF2-40B4-BE49-F238E27FC236}">
+                <a16:creationId xmlns:a16="http://schemas.microsoft.com/office/drawing/2014/main" id="{C31473A3-A8EB-B7A5-49F7-E89ECD1DE0CB}"/>
+              </a:ext>
+            </a:extLst>
+          </p:cNvPr>
+          <p:cNvSpPr>
+            <a:spLocks noGrp="1"/>
+          </p:cNvSpPr>
+          <p:nvPr>
+            <p:ph type="sldNum" sz="quarter" idx="5"/>
+          </p:nvPr>
+        </p:nvSpPr>
+        <p:spPr/>
+        <p:txBody>
+          <a:bodyPr/>
+          <a:lstStyle/>
+          <a:p>
+            <a:fld id="{96CC7BC8-50B2-A345-901D-1179A6286E32}" type="slidenum">
+              <a:rPr lang="en-US" smtClean="0"/>
+              <a:t>16</a:t>
+            </a:fld>
+            <a:endParaRPr lang="en-US"/>
+          </a:p>
+        </p:txBody>
+      </p:sp>
+    </p:spTree>
+    <p:extLst>
+      <p:ext uri="{BB962C8B-B14F-4D97-AF65-F5344CB8AC3E}">
+        <p14:creationId xmlns:p14="http://schemas.microsoft.com/office/powerpoint/2010/main" val="231634386"/>
       </p:ext>
     </p:extLst>
   </p:cSld>
@@ -9385,19 +9497,6 @@
             </a:r>
           </a:p>
           <a:p>
-            <a:r>
-              <a:rPr lang="en-US" dirty="0"/>
-              <a:t>Strategy</a:t>
-            </a:r>
-          </a:p>
-          <a:p>
-            <a:pPr lvl="1"/>
-            <a:r>
-              <a:rPr lang="en-US" sz="2400" dirty="0"/>
-              <a:t>Update the job script to run a simulation input file based on $SLURM_ARRAY_TASK_ID and $SLURM_ARRAY_TASK_COUNT</a:t>
-            </a:r>
-          </a:p>
-          <a:p>
             <a:endParaRPr lang="en-US" dirty="0"/>
           </a:p>
         </p:txBody>
@@ -9887,6 +9986,583 @@
   <p:cSld>
     <p:spTree>
       <p:nvGrpSpPr>
+        <p:cNvPr id="1" name="">
+          <a:extLst>
+            <a:ext uri="{FF2B5EF4-FFF2-40B4-BE49-F238E27FC236}">
+              <a16:creationId xmlns:a16="http://schemas.microsoft.com/office/drawing/2014/main" id="{F8931524-A4B0-008D-ECE1-9E9176B476E3}"/>
+            </a:ext>
+          </a:extLst>
+        </p:cNvPr>
+        <p:cNvGrpSpPr/>
+        <p:nvPr/>
+      </p:nvGrpSpPr>
+      <p:grpSpPr>
+        <a:xfrm>
+          <a:off x="0" y="0"/>
+          <a:ext cx="0" cy="0"/>
+          <a:chOff x="0" y="0"/>
+          <a:chExt cx="0" cy="0"/>
+        </a:xfrm>
+      </p:grpSpPr>
+      <p:sp>
+        <p:nvSpPr>
+          <p:cNvPr id="2" name="Content Placeholder 1">
+            <a:extLst>
+              <a:ext uri="{FF2B5EF4-FFF2-40B4-BE49-F238E27FC236}">
+                <a16:creationId xmlns:a16="http://schemas.microsoft.com/office/drawing/2014/main" id="{A03B4329-F6A6-844F-9C57-9055F09C9E27}"/>
+              </a:ext>
+            </a:extLst>
+          </p:cNvPr>
+          <p:cNvSpPr>
+            <a:spLocks noGrp="1"/>
+          </p:cNvSpPr>
+          <p:nvPr>
+            <p:ph sz="quarter" idx="10"/>
+          </p:nvPr>
+        </p:nvSpPr>
+        <p:spPr>
+          <a:xfrm>
+            <a:off x="633249" y="1293094"/>
+            <a:ext cx="6321734" cy="4830616"/>
+          </a:xfrm>
+        </p:spPr>
+        <p:txBody>
+          <a:bodyPr/>
+          <a:lstStyle/>
+          <a:p>
+            <a:r>
+              <a:rPr lang="en-US" dirty="0"/>
+              <a:t>Starting point: Several input files for molecular dynamics code, </a:t>
+            </a:r>
+            <a:r>
+              <a:rPr lang="en-US" dirty="0" err="1"/>
+              <a:t>lammps</a:t>
+            </a:r>
+            <a:endParaRPr lang="en-US" dirty="0"/>
+          </a:p>
+          <a:p>
+            <a:r>
+              <a:rPr lang="en-US" dirty="0"/>
+              <a:t>Goal: Use a Job Array run a </a:t>
+            </a:r>
+            <a:r>
+              <a:rPr lang="en-US" dirty="0" err="1"/>
+              <a:t>lammps</a:t>
+            </a:r>
+            <a:r>
+              <a:rPr lang="en-US" dirty="0"/>
+              <a:t> simulation on each input file concurrently</a:t>
+            </a:r>
+          </a:p>
+          <a:p>
+            <a:r>
+              <a:rPr lang="en-US" dirty="0"/>
+              <a:t>What are our inputs?</a:t>
+            </a:r>
+          </a:p>
+          <a:p>
+            <a:r>
+              <a:rPr lang="en-US" dirty="0"/>
+              <a:t>Strategy</a:t>
+            </a:r>
+          </a:p>
+          <a:p>
+            <a:pPr lvl="1"/>
+            <a:r>
+              <a:rPr lang="en-US" sz="2400" dirty="0"/>
+              <a:t>Update the job script to run a simulation input file based on $SLURM_ARRAY_TASK_ID and $SLURM_ARRAY_TASK_COUNT</a:t>
+            </a:r>
+          </a:p>
+          <a:p>
+            <a:endParaRPr lang="en-US" dirty="0"/>
+          </a:p>
+        </p:txBody>
+      </p:sp>
+      <p:sp>
+        <p:nvSpPr>
+          <p:cNvPr id="3" name="Title 2">
+            <a:extLst>
+              <a:ext uri="{FF2B5EF4-FFF2-40B4-BE49-F238E27FC236}">
+                <a16:creationId xmlns:a16="http://schemas.microsoft.com/office/drawing/2014/main" id="{0C01E119-7901-07B5-6A47-10EC0FC353AD}"/>
+              </a:ext>
+            </a:extLst>
+          </p:cNvPr>
+          <p:cNvSpPr>
+            <a:spLocks noGrp="1"/>
+          </p:cNvSpPr>
+          <p:nvPr>
+            <p:ph type="title"/>
+          </p:nvPr>
+        </p:nvSpPr>
+        <p:spPr/>
+        <p:txBody>
+          <a:bodyPr>
+            <a:normAutofit/>
+          </a:bodyPr>
+          <a:lstStyle/>
+          <a:p>
+            <a:r>
+              <a:rPr lang="en-US" dirty="0"/>
+              <a:t>Example 3: LAMMPS Input Files</a:t>
+            </a:r>
+          </a:p>
+        </p:txBody>
+      </p:sp>
+      <p:sp>
+        <p:nvSpPr>
+          <p:cNvPr id="5" name="TextBox 4">
+            <a:extLst>
+              <a:ext uri="{FF2B5EF4-FFF2-40B4-BE49-F238E27FC236}">
+                <a16:creationId xmlns:a16="http://schemas.microsoft.com/office/drawing/2014/main" id="{0AF2C074-B105-3690-00DD-822FD2DE8697}"/>
+              </a:ext>
+            </a:extLst>
+          </p:cNvPr>
+          <p:cNvSpPr txBox="1"/>
+          <p:nvPr/>
+        </p:nvSpPr>
+        <p:spPr>
+          <a:xfrm>
+            <a:off x="6954983" y="2000242"/>
+            <a:ext cx="5205846" cy="3416320"/>
+          </a:xfrm>
+          <a:prstGeom prst="rect">
+            <a:avLst/>
+          </a:prstGeom>
+          <a:noFill/>
+        </p:spPr>
+        <p:txBody>
+          <a:bodyPr wrap="square">
+            <a:spAutoFit/>
+          </a:bodyPr>
+          <a:lstStyle/>
+          <a:p>
+            <a:r>
+              <a:rPr lang="en-US" b="0" dirty="0">
+                <a:solidFill>
+                  <a:srgbClr val="6A9955"/>
+                </a:solidFill>
+                <a:effectLst/>
+                <a:latin typeface="Menlo" panose="020B0609030804020204" pitchFamily="49" charset="0"/>
+              </a:rPr>
+              <a:t>#!/bin/bash</a:t>
+            </a:r>
+            <a:endParaRPr lang="en-US" b="0" dirty="0">
+              <a:solidFill>
+                <a:srgbClr val="CCCCCC"/>
+              </a:solidFill>
+              <a:effectLst/>
+              <a:latin typeface="Menlo" panose="020B0609030804020204" pitchFamily="49" charset="0"/>
+            </a:endParaRPr>
+          </a:p>
+          <a:p>
+            <a:br>
+              <a:rPr lang="en-US" b="0" dirty="0">
+                <a:solidFill>
+                  <a:srgbClr val="CCCCCC"/>
+                </a:solidFill>
+                <a:effectLst/>
+                <a:latin typeface="Menlo" panose="020B0609030804020204" pitchFamily="49" charset="0"/>
+              </a:rPr>
+            </a:br>
+            <a:r>
+              <a:rPr lang="en-US" b="0" dirty="0">
+                <a:solidFill>
+                  <a:srgbClr val="6A9955"/>
+                </a:solidFill>
+                <a:effectLst/>
+                <a:latin typeface="Menlo" panose="020B0609030804020204" pitchFamily="49" charset="0"/>
+              </a:rPr>
+              <a:t>#SBATCH -p </a:t>
+            </a:r>
+            <a:r>
+              <a:rPr lang="en-US" b="0" dirty="0" err="1">
+                <a:solidFill>
+                  <a:srgbClr val="6A9955"/>
+                </a:solidFill>
+                <a:effectLst/>
+                <a:latin typeface="Menlo" panose="020B0609030804020204" pitchFamily="49" charset="0"/>
+              </a:rPr>
+              <a:t>mit_normal</a:t>
+            </a:r>
+            <a:endParaRPr lang="en-US" b="0" dirty="0">
+              <a:solidFill>
+                <a:srgbClr val="CCCCCC"/>
+              </a:solidFill>
+              <a:effectLst/>
+              <a:latin typeface="Menlo" panose="020B0609030804020204" pitchFamily="49" charset="0"/>
+            </a:endParaRPr>
+          </a:p>
+          <a:p>
+            <a:r>
+              <a:rPr lang="en-US" b="0" dirty="0">
+                <a:solidFill>
+                  <a:srgbClr val="6A9955"/>
+                </a:solidFill>
+                <a:effectLst/>
+                <a:latin typeface="Menlo" panose="020B0609030804020204" pitchFamily="49" charset="0"/>
+              </a:rPr>
+              <a:t>#SBATCH -o </a:t>
+            </a:r>
+            <a:r>
+              <a:rPr lang="en-US" b="0" dirty="0" err="1">
+                <a:solidFill>
+                  <a:srgbClr val="6A9955"/>
+                </a:solidFill>
+                <a:effectLst/>
+                <a:latin typeface="Menlo" panose="020B0609030804020204" pitchFamily="49" charset="0"/>
+              </a:rPr>
+              <a:t>log.lammps</a:t>
+            </a:r>
+            <a:r>
+              <a:rPr lang="en-US" b="0" dirty="0">
+                <a:solidFill>
+                  <a:srgbClr val="6A9955"/>
+                </a:solidFill>
+                <a:effectLst/>
+                <a:latin typeface="Menlo" panose="020B0609030804020204" pitchFamily="49" charset="0"/>
+              </a:rPr>
+              <a:t>-%j</a:t>
+            </a:r>
+            <a:endParaRPr lang="en-US" b="0" dirty="0">
+              <a:solidFill>
+                <a:srgbClr val="CCCCCC"/>
+              </a:solidFill>
+              <a:effectLst/>
+              <a:latin typeface="Menlo" panose="020B0609030804020204" pitchFamily="49" charset="0"/>
+            </a:endParaRPr>
+          </a:p>
+          <a:p>
+            <a:r>
+              <a:rPr lang="en-US" b="0" dirty="0">
+                <a:solidFill>
+                  <a:srgbClr val="6A9955"/>
+                </a:solidFill>
+                <a:effectLst/>
+                <a:latin typeface="Menlo" panose="020B0609030804020204" pitchFamily="49" charset="0"/>
+              </a:rPr>
+              <a:t>#SBATCH -n 4</a:t>
+            </a:r>
+            <a:endParaRPr lang="en-US" b="0" dirty="0">
+              <a:solidFill>
+                <a:srgbClr val="CCCCCC"/>
+              </a:solidFill>
+              <a:effectLst/>
+              <a:latin typeface="Menlo" panose="020B0609030804020204" pitchFamily="49" charset="0"/>
+            </a:endParaRPr>
+          </a:p>
+          <a:p>
+            <a:br>
+              <a:rPr lang="en-US" b="0" dirty="0">
+                <a:solidFill>
+                  <a:srgbClr val="CCCCCC"/>
+                </a:solidFill>
+                <a:effectLst/>
+                <a:latin typeface="Menlo" panose="020B0609030804020204" pitchFamily="49" charset="0"/>
+              </a:rPr>
+            </a:br>
+            <a:r>
+              <a:rPr lang="en-US" b="0" dirty="0">
+                <a:solidFill>
+                  <a:srgbClr val="DCDCAA"/>
+                </a:solidFill>
+                <a:effectLst/>
+                <a:latin typeface="Menlo" panose="020B0609030804020204" pitchFamily="49" charset="0"/>
+              </a:rPr>
+              <a:t>module</a:t>
+            </a:r>
+            <a:r>
+              <a:rPr lang="en-US" b="0" dirty="0">
+                <a:solidFill>
+                  <a:srgbClr val="CCCCCC"/>
+                </a:solidFill>
+                <a:effectLst/>
+                <a:latin typeface="Menlo" panose="020B0609030804020204" pitchFamily="49" charset="0"/>
+              </a:rPr>
+              <a:t> </a:t>
+            </a:r>
+            <a:r>
+              <a:rPr lang="en-US" b="0" dirty="0">
+                <a:solidFill>
+                  <a:srgbClr val="CE9178"/>
+                </a:solidFill>
+                <a:effectLst/>
+                <a:latin typeface="Menlo" panose="020B0609030804020204" pitchFamily="49" charset="0"/>
+              </a:rPr>
+              <a:t>load</a:t>
+            </a:r>
+            <a:r>
+              <a:rPr lang="en-US" b="0" dirty="0">
+                <a:solidFill>
+                  <a:srgbClr val="CCCCCC"/>
+                </a:solidFill>
+                <a:effectLst/>
+                <a:latin typeface="Menlo" panose="020B0609030804020204" pitchFamily="49" charset="0"/>
+              </a:rPr>
+              <a:t> </a:t>
+            </a:r>
+            <a:r>
+              <a:rPr lang="en-US" b="0" dirty="0" err="1">
+                <a:solidFill>
+                  <a:srgbClr val="CE9178"/>
+                </a:solidFill>
+                <a:effectLst/>
+                <a:latin typeface="Menlo" panose="020B0609030804020204" pitchFamily="49" charset="0"/>
+              </a:rPr>
+              <a:t>openmpi</a:t>
+            </a:r>
+            <a:r>
+              <a:rPr lang="en-US" b="0" dirty="0">
+                <a:solidFill>
+                  <a:srgbClr val="CE9178"/>
+                </a:solidFill>
+                <a:effectLst/>
+                <a:latin typeface="Menlo" panose="020B0609030804020204" pitchFamily="49" charset="0"/>
+              </a:rPr>
+              <a:t>/4.1.4</a:t>
+            </a:r>
+            <a:endParaRPr lang="en-US" b="0" dirty="0">
+              <a:solidFill>
+                <a:srgbClr val="CCCCCC"/>
+              </a:solidFill>
+              <a:effectLst/>
+              <a:latin typeface="Menlo" panose="020B0609030804020204" pitchFamily="49" charset="0"/>
+            </a:endParaRPr>
+          </a:p>
+          <a:p>
+            <a:r>
+              <a:rPr lang="en-US" b="0" dirty="0">
+                <a:solidFill>
+                  <a:srgbClr val="DCDCAA"/>
+                </a:solidFill>
+                <a:effectLst/>
+                <a:latin typeface="Menlo" panose="020B0609030804020204" pitchFamily="49" charset="0"/>
+              </a:rPr>
+              <a:t>module</a:t>
+            </a:r>
+            <a:r>
+              <a:rPr lang="en-US" b="0" dirty="0">
+                <a:solidFill>
+                  <a:srgbClr val="CCCCCC"/>
+                </a:solidFill>
+                <a:effectLst/>
+                <a:latin typeface="Menlo" panose="020B0609030804020204" pitchFamily="49" charset="0"/>
+              </a:rPr>
+              <a:t> </a:t>
+            </a:r>
+            <a:r>
+              <a:rPr lang="en-US" b="0" dirty="0">
+                <a:solidFill>
+                  <a:srgbClr val="CE9178"/>
+                </a:solidFill>
+                <a:effectLst/>
+                <a:latin typeface="Menlo" panose="020B0609030804020204" pitchFamily="49" charset="0"/>
+              </a:rPr>
+              <a:t>load</a:t>
+            </a:r>
+            <a:r>
+              <a:rPr lang="en-US" b="0" dirty="0">
+                <a:solidFill>
+                  <a:srgbClr val="CCCCCC"/>
+                </a:solidFill>
+                <a:effectLst/>
+                <a:latin typeface="Menlo" panose="020B0609030804020204" pitchFamily="49" charset="0"/>
+              </a:rPr>
+              <a:t> </a:t>
+            </a:r>
+            <a:r>
+              <a:rPr lang="en-US" b="0" dirty="0" err="1">
+                <a:solidFill>
+                  <a:srgbClr val="CE9178"/>
+                </a:solidFill>
+                <a:effectLst/>
+                <a:latin typeface="Menlo" panose="020B0609030804020204" pitchFamily="49" charset="0"/>
+              </a:rPr>
+              <a:t>lammps</a:t>
+            </a:r>
+            <a:r>
+              <a:rPr lang="en-US" b="0" dirty="0">
+                <a:solidFill>
+                  <a:srgbClr val="CE9178"/>
+                </a:solidFill>
+                <a:effectLst/>
+                <a:latin typeface="Menlo" panose="020B0609030804020204" pitchFamily="49" charset="0"/>
+              </a:rPr>
+              <a:t>/20230802.3</a:t>
+            </a:r>
+            <a:endParaRPr lang="en-US" b="0" dirty="0">
+              <a:solidFill>
+                <a:srgbClr val="CCCCCC"/>
+              </a:solidFill>
+              <a:effectLst/>
+              <a:latin typeface="Menlo" panose="020B0609030804020204" pitchFamily="49" charset="0"/>
+            </a:endParaRPr>
+          </a:p>
+          <a:p>
+            <a:br>
+              <a:rPr lang="en-US" b="0" dirty="0">
+                <a:solidFill>
+                  <a:srgbClr val="CCCCCC"/>
+                </a:solidFill>
+                <a:effectLst/>
+                <a:latin typeface="Menlo" panose="020B0609030804020204" pitchFamily="49" charset="0"/>
+              </a:rPr>
+            </a:br>
+            <a:r>
+              <a:rPr lang="en-US" b="0" dirty="0" err="1">
+                <a:solidFill>
+                  <a:srgbClr val="DCDCAA"/>
+                </a:solidFill>
+                <a:effectLst/>
+                <a:latin typeface="Menlo" panose="020B0609030804020204" pitchFamily="49" charset="0"/>
+              </a:rPr>
+              <a:t>mpirun</a:t>
+            </a:r>
+            <a:r>
+              <a:rPr lang="en-US" b="0" dirty="0">
+                <a:solidFill>
+                  <a:srgbClr val="CCCCCC"/>
+                </a:solidFill>
+                <a:effectLst/>
+                <a:latin typeface="Menlo" panose="020B0609030804020204" pitchFamily="49" charset="0"/>
+              </a:rPr>
+              <a:t> </a:t>
+            </a:r>
+            <a:r>
+              <a:rPr lang="en-US" b="0" dirty="0" err="1">
+                <a:solidFill>
+                  <a:srgbClr val="CE9178"/>
+                </a:solidFill>
+                <a:effectLst/>
+                <a:latin typeface="Menlo" panose="020B0609030804020204" pitchFamily="49" charset="0"/>
+              </a:rPr>
+              <a:t>lmp</a:t>
+            </a:r>
+            <a:r>
+              <a:rPr lang="en-US" b="0" dirty="0">
+                <a:solidFill>
+                  <a:srgbClr val="CCCCCC"/>
+                </a:solidFill>
+                <a:effectLst/>
+                <a:latin typeface="Menlo" panose="020B0609030804020204" pitchFamily="49" charset="0"/>
+              </a:rPr>
+              <a:t> </a:t>
+            </a:r>
+            <a:r>
+              <a:rPr lang="en-US" b="0" dirty="0">
+                <a:solidFill>
+                  <a:srgbClr val="569CD6"/>
+                </a:solidFill>
+                <a:effectLst/>
+                <a:latin typeface="Menlo" panose="020B0609030804020204" pitchFamily="49" charset="0"/>
+              </a:rPr>
+              <a:t>-in</a:t>
+            </a:r>
+            <a:r>
+              <a:rPr lang="en-US" b="0" dirty="0">
+                <a:solidFill>
+                  <a:srgbClr val="CCCCCC"/>
+                </a:solidFill>
+                <a:effectLst/>
+                <a:latin typeface="Menlo" panose="020B0609030804020204" pitchFamily="49" charset="0"/>
+              </a:rPr>
+              <a:t> </a:t>
+            </a:r>
+            <a:r>
+              <a:rPr lang="en-US" b="0" dirty="0" err="1">
+                <a:solidFill>
+                  <a:srgbClr val="CE9178"/>
+                </a:solidFill>
+                <a:effectLst/>
+                <a:latin typeface="Menlo" panose="020B0609030804020204" pitchFamily="49" charset="0"/>
+              </a:rPr>
+              <a:t>in.heatflux</a:t>
+            </a:r>
+            <a:r>
+              <a:rPr lang="en-US" b="0" dirty="0">
+                <a:solidFill>
+                  <a:srgbClr val="CCCCCC"/>
+                </a:solidFill>
+                <a:effectLst/>
+                <a:latin typeface="Menlo" panose="020B0609030804020204" pitchFamily="49" charset="0"/>
+              </a:rPr>
+              <a:t> </a:t>
+            </a:r>
+            <a:r>
+              <a:rPr lang="en-US" b="0" dirty="0">
+                <a:solidFill>
+                  <a:srgbClr val="569CD6"/>
+                </a:solidFill>
+                <a:effectLst/>
+                <a:latin typeface="Menlo" panose="020B0609030804020204" pitchFamily="49" charset="0"/>
+              </a:rPr>
+              <a:t>-log</a:t>
+            </a:r>
+            <a:r>
+              <a:rPr lang="en-US" b="0" dirty="0">
+                <a:solidFill>
+                  <a:srgbClr val="CCCCCC"/>
+                </a:solidFill>
+                <a:effectLst/>
+                <a:latin typeface="Menlo" panose="020B0609030804020204" pitchFamily="49" charset="0"/>
+              </a:rPr>
+              <a:t> </a:t>
+            </a:r>
+            <a:r>
+              <a:rPr lang="en-US" b="0" dirty="0">
+                <a:solidFill>
+                  <a:srgbClr val="CE9178"/>
+                </a:solidFill>
+                <a:effectLst/>
+                <a:latin typeface="Menlo" panose="020B0609030804020204" pitchFamily="49" charset="0"/>
+              </a:rPr>
+              <a:t>none</a:t>
+            </a:r>
+            <a:endParaRPr lang="en-US" b="0" dirty="0">
+              <a:solidFill>
+                <a:srgbClr val="CCCCCC"/>
+              </a:solidFill>
+              <a:effectLst/>
+              <a:latin typeface="Menlo" panose="020B0609030804020204" pitchFamily="49" charset="0"/>
+            </a:endParaRPr>
+          </a:p>
+          <a:p>
+            <a:br>
+              <a:rPr lang="en-US" b="0" dirty="0">
+                <a:solidFill>
+                  <a:srgbClr val="CCCCCC"/>
+                </a:solidFill>
+                <a:effectLst/>
+                <a:latin typeface="Menlo" panose="020B0609030804020204" pitchFamily="49" charset="0"/>
+              </a:rPr>
+            </a:br>
+            <a:endParaRPr lang="en-US" b="0" dirty="0">
+              <a:solidFill>
+                <a:srgbClr val="CCCCCC"/>
+              </a:solidFill>
+              <a:effectLst/>
+              <a:latin typeface="Menlo" panose="020B0609030804020204" pitchFamily="49" charset="0"/>
+            </a:endParaRPr>
+          </a:p>
+        </p:txBody>
+      </p:sp>
+    </p:spTree>
+    <p:extLst>
+      <p:ext uri="{BB962C8B-B14F-4D97-AF65-F5344CB8AC3E}">
+        <p14:creationId xmlns:p14="http://schemas.microsoft.com/office/powerpoint/2010/main" val="2193339498"/>
+      </p:ext>
+    </p:extLst>
+  </p:cSld>
+  <p:clrMapOvr>
+    <a:masterClrMapping/>
+  </p:clrMapOvr>
+</p:sld>
+</file>
+
+<file path=ppt/slides/slide17.xml><?xml version="1.0" encoding="utf-8"?>
+<p:sld xmlns:a="http://schemas.openxmlformats.org/drawingml/2006/main" xmlns:r="http://schemas.openxmlformats.org/officeDocument/2006/relationships" xmlns:p="http://schemas.openxmlformats.org/presentationml/2006/main">
+  <p:cSld>
+    <p:spTree>
+      <p:nvGrpSpPr>
         <p:cNvPr id="1" name=""/>
         <p:cNvGrpSpPr/>
         <p:nvPr/>
@@ -9965,7 +10641,7 @@
 </p:sld>
 </file>
 
-<file path=ppt/slides/slide17.xml><?xml version="1.0" encoding="utf-8"?>
+<file path=ppt/slides/slide18.xml><?xml version="1.0" encoding="utf-8"?>
 <p:sld xmlns:a="http://schemas.openxmlformats.org/drawingml/2006/main" xmlns:r="http://schemas.openxmlformats.org/officeDocument/2006/relationships" xmlns:p="http://schemas.openxmlformats.org/presentationml/2006/main">
   <p:cSld>
     <p:spTree>
@@ -10504,13 +11180,8 @@
             </a:br>
             <a:r>
               <a:rPr lang="en-US" dirty="0"/>
-              <a:t>Tuesday </a:t>
-            </a:r>
-            <a:r>
-              <a:rPr lang="en-US"/>
-              <a:t>January 28, 2025</a:t>
-            </a:r>
-            <a:endParaRPr lang="en-US" dirty="0"/>
+              <a:t>Tuesday January 28, 2025</a:t>
+            </a:r>
           </a:p>
         </p:txBody>
       </p:sp>

</xml_diff>

<commit_message>
adding dask example github repo
</commit_message>
<xml_diff>
--- a/docs/slides/03-IAP25-Day3.pptx
+++ b/docs/slides/03-IAP25-Day3.pptx
@@ -225,7 +225,7 @@
           <a:p>
             <a:fld id="{0273C65C-C61C-0C44-BE53-CD4E23C09CC1}" type="datetimeFigureOut">
               <a:rPr lang="en-US" smtClean="0"/>
-              <a:t>1/27/25</a:t>
+              <a:t>1/28/25</a:t>
             </a:fld>
             <a:endParaRPr lang="en-US"/>
           </a:p>
@@ -584,6 +584,117 @@
         <p:cNvPr id="1" name="">
           <a:extLst>
             <a:ext uri="{FF2B5EF4-FFF2-40B4-BE49-F238E27FC236}">
+              <a16:creationId xmlns:a16="http://schemas.microsoft.com/office/drawing/2014/main" id="{A195D6CF-D33A-6467-1268-1BF88712DE8B}"/>
+            </a:ext>
+          </a:extLst>
+        </p:cNvPr>
+        <p:cNvGrpSpPr/>
+        <p:nvPr/>
+      </p:nvGrpSpPr>
+      <p:grpSpPr>
+        <a:xfrm>
+          <a:off x="0" y="0"/>
+          <a:ext cx="0" cy="0"/>
+          <a:chOff x="0" y="0"/>
+          <a:chExt cx="0" cy="0"/>
+        </a:xfrm>
+      </p:grpSpPr>
+      <p:sp>
+        <p:nvSpPr>
+          <p:cNvPr id="2" name="Slide Image Placeholder 1">
+            <a:extLst>
+              <a:ext uri="{FF2B5EF4-FFF2-40B4-BE49-F238E27FC236}">
+                <a16:creationId xmlns:a16="http://schemas.microsoft.com/office/drawing/2014/main" id="{F31CC972-38D3-F2A8-4C16-894A8E232F25}"/>
+              </a:ext>
+            </a:extLst>
+          </p:cNvPr>
+          <p:cNvSpPr>
+            <a:spLocks noGrp="1" noRot="1" noChangeAspect="1"/>
+          </p:cNvSpPr>
+          <p:nvPr>
+            <p:ph type="sldImg"/>
+          </p:nvPr>
+        </p:nvSpPr>
+        <p:spPr/>
+      </p:sp>
+      <p:sp>
+        <p:nvSpPr>
+          <p:cNvPr id="3" name="Notes Placeholder 2">
+            <a:extLst>
+              <a:ext uri="{FF2B5EF4-FFF2-40B4-BE49-F238E27FC236}">
+                <a16:creationId xmlns:a16="http://schemas.microsoft.com/office/drawing/2014/main" id="{53270FB2-6C70-D5BD-BAA9-460B52DED22F}"/>
+              </a:ext>
+            </a:extLst>
+          </p:cNvPr>
+          <p:cNvSpPr>
+            <a:spLocks noGrp="1"/>
+          </p:cNvSpPr>
+          <p:nvPr>
+            <p:ph type="body" idx="1"/>
+          </p:nvPr>
+        </p:nvSpPr>
+        <p:spPr/>
+        <p:txBody>
+          <a:bodyPr/>
+          <a:lstStyle/>
+          <a:p>
+            <a:r>
+              <a:rPr lang="en-US" dirty="0"/>
+              <a:t>How could we do overall world count?</a:t>
+            </a:r>
+          </a:p>
+        </p:txBody>
+      </p:sp>
+      <p:sp>
+        <p:nvSpPr>
+          <p:cNvPr id="4" name="Slide Number Placeholder 3">
+            <a:extLst>
+              <a:ext uri="{FF2B5EF4-FFF2-40B4-BE49-F238E27FC236}">
+                <a16:creationId xmlns:a16="http://schemas.microsoft.com/office/drawing/2014/main" id="{5CA3E449-4805-F65E-FDBE-7D059EDD3C87}"/>
+              </a:ext>
+            </a:extLst>
+          </p:cNvPr>
+          <p:cNvSpPr>
+            <a:spLocks noGrp="1"/>
+          </p:cNvSpPr>
+          <p:nvPr>
+            <p:ph type="sldNum" sz="quarter" idx="5"/>
+          </p:nvPr>
+        </p:nvSpPr>
+        <p:spPr/>
+        <p:txBody>
+          <a:bodyPr/>
+          <a:lstStyle/>
+          <a:p>
+            <a:fld id="{96CC7BC8-50B2-A345-901D-1179A6286E32}" type="slidenum">
+              <a:rPr lang="en-US" smtClean="0"/>
+              <a:t>12</a:t>
+            </a:fld>
+            <a:endParaRPr lang="en-US"/>
+          </a:p>
+        </p:txBody>
+      </p:sp>
+    </p:spTree>
+    <p:extLst>
+      <p:ext uri="{BB962C8B-B14F-4D97-AF65-F5344CB8AC3E}">
+        <p14:creationId xmlns:p14="http://schemas.microsoft.com/office/powerpoint/2010/main" val="2954420720"/>
+      </p:ext>
+    </p:extLst>
+  </p:cSld>
+  <p:clrMapOvr>
+    <a:masterClrMapping/>
+  </p:clrMapOvr>
+</p:notes>
+</file>
+
+<file path=ppt/notesSlides/notesSlide11.xml><?xml version="1.0" encoding="utf-8"?>
+<p:notes xmlns:a="http://schemas.openxmlformats.org/drawingml/2006/main" xmlns:r="http://schemas.openxmlformats.org/officeDocument/2006/relationships" xmlns:p="http://schemas.openxmlformats.org/presentationml/2006/main">
+  <p:cSld>
+    <p:spTree>
+      <p:nvGrpSpPr>
+        <p:cNvPr id="1" name="">
+          <a:extLst>
+            <a:ext uri="{FF2B5EF4-FFF2-40B4-BE49-F238E27FC236}">
               <a16:creationId xmlns:a16="http://schemas.microsoft.com/office/drawing/2014/main" id="{9C364977-5F76-2EDD-3E00-D081CE7459FD}"/>
             </a:ext>
           </a:extLst>
@@ -687,7 +798,7 @@
 </p:notes>
 </file>
 
-<file path=ppt/notesSlides/notesSlide11.xml><?xml version="1.0" encoding="utf-8"?>
+<file path=ppt/notesSlides/notesSlide12.xml><?xml version="1.0" encoding="utf-8"?>
 <p:notes xmlns:a="http://schemas.openxmlformats.org/drawingml/2006/main" xmlns:r="http://schemas.openxmlformats.org/officeDocument/2006/relationships" xmlns:p="http://schemas.openxmlformats.org/presentationml/2006/main">
   <p:cSld>
     <p:spTree>
@@ -798,7 +909,7 @@
 </p:notes>
 </file>
 
-<file path=ppt/notesSlides/notesSlide12.xml><?xml version="1.0" encoding="utf-8"?>
+<file path=ppt/notesSlides/notesSlide13.xml><?xml version="1.0" encoding="utf-8"?>
 <p:notes xmlns:a="http://schemas.openxmlformats.org/drawingml/2006/main" xmlns:r="http://schemas.openxmlformats.org/officeDocument/2006/relationships" xmlns:p="http://schemas.openxmlformats.org/presentationml/2006/main">
   <p:cSld>
     <p:spTree>
@@ -909,7 +1020,7 @@
 </p:notes>
 </file>
 
-<file path=ppt/notesSlides/notesSlide13.xml><?xml version="1.0" encoding="utf-8"?>
+<file path=ppt/notesSlides/notesSlide14.xml><?xml version="1.0" encoding="utf-8"?>
 <p:notes xmlns:a="http://schemas.openxmlformats.org/drawingml/2006/main" xmlns:r="http://schemas.openxmlformats.org/officeDocument/2006/relationships" xmlns:p="http://schemas.openxmlformats.org/presentationml/2006/main">
   <p:cSld>
     <p:spTree>
@@ -1064,40 +1175,56 @@
           <a:bodyPr/>
           <a:lstStyle/>
           <a:p>
-            <a:r>
-              <a:rPr lang="en-US" dirty="0"/>
-              <a:t>Recall the word count problem. This was true “throughput”, each ”run” is a serial program, run on a different input or set of inputs. But what if we want to do a hyperparameter sweep of a machine learning problem? Or we want to run many groundwater model simulations at the same time? What if the application we want to run concurrently is multithreaded?</a:t>
-            </a:r>
-          </a:p>
-          <a:p>
-            <a:endParaRPr lang="en-US" dirty="0"/>
-          </a:p>
-          <a:p>
-            <a:r>
-              <a:rPr lang="en-US" dirty="0"/>
-              <a:t>To be precise, we can say we are running many shared memory applications concurrently. Technically this isn’t “high throughput” anymore, but we can use the same tools to run them. However, we have to take into account their resource requirements and think about how we can optimize how we are submitting them.</a:t>
-            </a:r>
-          </a:p>
-          <a:p>
-            <a:endParaRPr lang="en-US" dirty="0"/>
-          </a:p>
-          <a:p>
-            <a:r>
-              <a:rPr lang="en-US" dirty="0"/>
-              <a:t>How can we:</a:t>
-            </a:r>
-          </a:p>
-          <a:p>
-            <a:r>
-              <a:rPr lang="en-US" dirty="0"/>
-              <a:t>Make sure we don’t overwhelm the node -&gt; control how many are running on each node</a:t>
-            </a:r>
-          </a:p>
-          <a:p>
-            <a:r>
-              <a:rPr lang="en-US" dirty="0"/>
-              <a:t>Get the most out of our resources (we already saw using too many threads for a single task can slow you down) -&gt; control how many threads are running per process</a:t>
-            </a:r>
+            <a:pPr>
+              <a:buFont typeface="+mj-lt"/>
+              <a:buAutoNum type="arabicPeriod"/>
+            </a:pPr>
+            <a:r>
+              <a:rPr lang="en-US" dirty="0">
+                <a:effectLst/>
+                <a:latin typeface="Helvetica Neue" panose="02000503000000020004" pitchFamily="2" charset="0"/>
+              </a:rPr>
+              <a:t>Ask students</a:t>
+            </a:r>
+          </a:p>
+          <a:p>
+            <a:pPr marL="742950" lvl="1" indent="-285750">
+              <a:buFont typeface="+mj-lt"/>
+              <a:buAutoNum type="arabicPeriod"/>
+            </a:pPr>
+            <a:r>
+              <a:rPr lang="en-US" dirty="0">
+                <a:effectLst/>
+                <a:latin typeface="Helvetica Neue" panose="02000503000000020004" pitchFamily="2" charset="0"/>
+              </a:rPr>
+              <a:t>Who has a throughput application? Who thinks they might in the future?</a:t>
+            </a:r>
+          </a:p>
+          <a:p>
+            <a:r>
+              <a:rPr lang="en-US" dirty="0">
+                <a:effectLst/>
+                <a:latin typeface="Menlo" panose="020B0609030804020204" pitchFamily="49" charset="0"/>
+              </a:rPr>
+              <a:t>• </a:t>
+            </a:r>
+            <a:r>
+              <a:rPr lang="en-US" dirty="0">
+                <a:effectLst/>
+                <a:latin typeface="Helvetica Neue" panose="02000503000000020004" pitchFamily="2" charset="0"/>
+              </a:rPr>
+              <a:t>2. </a:t>
+            </a:r>
+            <a:r>
+              <a:rPr lang="en-US">
+                <a:effectLst/>
+                <a:latin typeface="Helvetica Neue" panose="02000503000000020004" pitchFamily="2" charset="0"/>
+              </a:rPr>
+              <a:t>Does anyone want to describe their application?</a:t>
+            </a:r>
+          </a:p>
+          <a:p>
+            <a:endParaRPr lang="en-US"/>
           </a:p>
         </p:txBody>
       </p:sp>
@@ -1116,9 +1243,9 @@
           <a:bodyPr/>
           <a:lstStyle/>
           <a:p>
-            <a:fld id="{3E654224-E74F-DD4A-9D07-B28B1747E03D}" type="slidenum">
+            <a:fld id="{96CC7BC8-50B2-A345-901D-1179A6286E32}" type="slidenum">
               <a:rPr lang="en-US" smtClean="0"/>
-              <a:t>5</a:t>
+              <a:t>4</a:t>
             </a:fld>
             <a:endParaRPr lang="en-US"/>
           </a:p>
@@ -1127,7 +1254,7 @@
     </p:spTree>
     <p:extLst>
       <p:ext uri="{BB962C8B-B14F-4D97-AF65-F5344CB8AC3E}">
-        <p14:creationId xmlns:p14="http://schemas.microsoft.com/office/powerpoint/2010/main" val="2617595440"/>
+        <p14:creationId xmlns:p14="http://schemas.microsoft.com/office/powerpoint/2010/main" val="2413876008"/>
       </p:ext>
     </p:extLst>
   </p:cSld>
@@ -1235,7 +1362,7 @@
           <a:p>
             <a:fld id="{3E654224-E74F-DD4A-9D07-B28B1747E03D}" type="slidenum">
               <a:rPr lang="en-US" smtClean="0"/>
-              <a:t>6</a:t>
+              <a:t>5</a:t>
             </a:fld>
             <a:endParaRPr lang="en-US"/>
           </a:p>
@@ -1244,7 +1371,7 @@
     </p:spTree>
     <p:extLst>
       <p:ext uri="{BB962C8B-B14F-4D97-AF65-F5344CB8AC3E}">
-        <p14:creationId xmlns:p14="http://schemas.microsoft.com/office/powerpoint/2010/main" val="3317676384"/>
+        <p14:creationId xmlns:p14="http://schemas.microsoft.com/office/powerpoint/2010/main" val="2617595440"/>
       </p:ext>
     </p:extLst>
   </p:cSld>
@@ -1298,6 +1425,123 @@
           <a:bodyPr/>
           <a:lstStyle/>
           <a:p>
+            <a:r>
+              <a:rPr lang="en-US" dirty="0"/>
+              <a:t>Recall the word count problem. This was true “throughput”, each ”run” is a serial program, run on a different input or set of inputs. But what if we want to do a hyperparameter sweep of a machine learning problem? Or we want to run many groundwater model simulations at the same time? What if the application we want to run concurrently is multithreaded?</a:t>
+            </a:r>
+          </a:p>
+          <a:p>
+            <a:endParaRPr lang="en-US" dirty="0"/>
+          </a:p>
+          <a:p>
+            <a:r>
+              <a:rPr lang="en-US" dirty="0"/>
+              <a:t>To be precise, we can say we are running many shared memory applications concurrently. Technically this isn’t “high throughput” anymore, but we can use the same tools to run them. However, we have to take into account their resource requirements and think about how we can optimize how we are submitting them.</a:t>
+            </a:r>
+          </a:p>
+          <a:p>
+            <a:endParaRPr lang="en-US" dirty="0"/>
+          </a:p>
+          <a:p>
+            <a:r>
+              <a:rPr lang="en-US" dirty="0"/>
+              <a:t>How can we:</a:t>
+            </a:r>
+          </a:p>
+          <a:p>
+            <a:r>
+              <a:rPr lang="en-US" dirty="0"/>
+              <a:t>Make sure we don’t overwhelm the node -&gt; control how many are running on each node</a:t>
+            </a:r>
+          </a:p>
+          <a:p>
+            <a:r>
+              <a:rPr lang="en-US" dirty="0"/>
+              <a:t>Get the most out of our resources (we already saw using too many threads for a single task can slow you down) -&gt; control how many threads are running per process</a:t>
+            </a:r>
+          </a:p>
+        </p:txBody>
+      </p:sp>
+      <p:sp>
+        <p:nvSpPr>
+          <p:cNvPr id="4" name="Slide Number Placeholder 3"/>
+          <p:cNvSpPr>
+            <a:spLocks noGrp="1"/>
+          </p:cNvSpPr>
+          <p:nvPr>
+            <p:ph type="sldNum" sz="quarter" idx="5"/>
+          </p:nvPr>
+        </p:nvSpPr>
+        <p:spPr/>
+        <p:txBody>
+          <a:bodyPr/>
+          <a:lstStyle/>
+          <a:p>
+            <a:fld id="{3E654224-E74F-DD4A-9D07-B28B1747E03D}" type="slidenum">
+              <a:rPr lang="en-US" smtClean="0"/>
+              <a:t>6</a:t>
+            </a:fld>
+            <a:endParaRPr lang="en-US"/>
+          </a:p>
+        </p:txBody>
+      </p:sp>
+    </p:spTree>
+    <p:extLst>
+      <p:ext uri="{BB962C8B-B14F-4D97-AF65-F5344CB8AC3E}">
+        <p14:creationId xmlns:p14="http://schemas.microsoft.com/office/powerpoint/2010/main" val="3317676384"/>
+      </p:ext>
+    </p:extLst>
+  </p:cSld>
+  <p:clrMapOvr>
+    <a:masterClrMapping/>
+  </p:clrMapOvr>
+</p:notes>
+</file>
+
+<file path=ppt/notesSlides/notesSlide5.xml><?xml version="1.0" encoding="utf-8"?>
+<p:notes xmlns:a="http://schemas.openxmlformats.org/drawingml/2006/main" xmlns:r="http://schemas.openxmlformats.org/officeDocument/2006/relationships" xmlns:p="http://schemas.openxmlformats.org/presentationml/2006/main">
+  <p:cSld>
+    <p:spTree>
+      <p:nvGrpSpPr>
+        <p:cNvPr id="1" name=""/>
+        <p:cNvGrpSpPr/>
+        <p:nvPr/>
+      </p:nvGrpSpPr>
+      <p:grpSpPr>
+        <a:xfrm>
+          <a:off x="0" y="0"/>
+          <a:ext cx="0" cy="0"/>
+          <a:chOff x="0" y="0"/>
+          <a:chExt cx="0" cy="0"/>
+        </a:xfrm>
+      </p:grpSpPr>
+      <p:sp>
+        <p:nvSpPr>
+          <p:cNvPr id="2" name="Slide Image Placeholder 1"/>
+          <p:cNvSpPr>
+            <a:spLocks noGrp="1" noRot="1" noChangeAspect="1"/>
+          </p:cNvSpPr>
+          <p:nvPr>
+            <p:ph type="sldImg"/>
+          </p:nvPr>
+        </p:nvSpPr>
+        <p:spPr/>
+      </p:sp>
+      <p:sp>
+        <p:nvSpPr>
+          <p:cNvPr id="3" name="Notes Placeholder 2"/>
+          <p:cNvSpPr>
+            <a:spLocks noGrp="1"/>
+          </p:cNvSpPr>
+          <p:nvPr>
+            <p:ph type="body" idx="1"/>
+          </p:nvPr>
+        </p:nvSpPr>
+        <p:spPr/>
+        <p:txBody>
+          <a:bodyPr/>
+          <a:lstStyle/>
+          <a:p>
             <a:endParaRPr lang="en-US" dirty="0"/>
           </a:p>
         </p:txBody>
@@ -1338,7 +1582,7 @@
 </p:notes>
 </file>
 
-<file path=ppt/notesSlides/notesSlide5.xml><?xml version="1.0" encoding="utf-8"?>
+<file path=ppt/notesSlides/notesSlide6.xml><?xml version="1.0" encoding="utf-8"?>
 <p:notes xmlns:a="http://schemas.openxmlformats.org/drawingml/2006/main" xmlns:r="http://schemas.openxmlformats.org/officeDocument/2006/relationships" xmlns:p="http://schemas.openxmlformats.org/presentationml/2006/main">
   <p:cSld>
     <p:spTree>
@@ -1449,7 +1693,7 @@
 </p:notes>
 </file>
 
-<file path=ppt/notesSlides/notesSlide6.xml><?xml version="1.0" encoding="utf-8"?>
+<file path=ppt/notesSlides/notesSlide7.xml><?xml version="1.0" encoding="utf-8"?>
 <p:notes xmlns:a="http://schemas.openxmlformats.org/drawingml/2006/main" xmlns:r="http://schemas.openxmlformats.org/officeDocument/2006/relationships" xmlns:p="http://schemas.openxmlformats.org/presentationml/2006/main">
   <p:cSld>
     <p:spTree>
@@ -1560,7 +1804,7 @@
 </p:notes>
 </file>
 
-<file path=ppt/notesSlides/notesSlide7.xml><?xml version="1.0" encoding="utf-8"?>
+<file path=ppt/notesSlides/notesSlide8.xml><?xml version="1.0" encoding="utf-8"?>
 <p:notes xmlns:a="http://schemas.openxmlformats.org/drawingml/2006/main" xmlns:r="http://schemas.openxmlformats.org/officeDocument/2006/relationships" xmlns:p="http://schemas.openxmlformats.org/presentationml/2006/main">
   <p:cSld>
     <p:spTree>
@@ -1668,7 +1912,7 @@
 </p:notes>
 </file>
 
-<file path=ppt/notesSlides/notesSlide8.xml><?xml version="1.0" encoding="utf-8"?>
+<file path=ppt/notesSlides/notesSlide9.xml><?xml version="1.0" encoding="utf-8"?>
 <p:notes xmlns:a="http://schemas.openxmlformats.org/drawingml/2006/main" xmlns:r="http://schemas.openxmlformats.org/officeDocument/2006/relationships" xmlns:p="http://schemas.openxmlformats.org/presentationml/2006/main">
   <p:cSld>
     <p:spTree>
@@ -1770,117 +2014,6 @@
     <p:extLst>
       <p:ext uri="{BB962C8B-B14F-4D97-AF65-F5344CB8AC3E}">
         <p14:creationId xmlns:p14="http://schemas.microsoft.com/office/powerpoint/2010/main" val="1477881024"/>
-      </p:ext>
-    </p:extLst>
-  </p:cSld>
-  <p:clrMapOvr>
-    <a:masterClrMapping/>
-  </p:clrMapOvr>
-</p:notes>
-</file>
-
-<file path=ppt/notesSlides/notesSlide9.xml><?xml version="1.0" encoding="utf-8"?>
-<p:notes xmlns:a="http://schemas.openxmlformats.org/drawingml/2006/main" xmlns:r="http://schemas.openxmlformats.org/officeDocument/2006/relationships" xmlns:p="http://schemas.openxmlformats.org/presentationml/2006/main">
-  <p:cSld>
-    <p:spTree>
-      <p:nvGrpSpPr>
-        <p:cNvPr id="1" name="">
-          <a:extLst>
-            <a:ext uri="{FF2B5EF4-FFF2-40B4-BE49-F238E27FC236}">
-              <a16:creationId xmlns:a16="http://schemas.microsoft.com/office/drawing/2014/main" id="{A195D6CF-D33A-6467-1268-1BF88712DE8B}"/>
-            </a:ext>
-          </a:extLst>
-        </p:cNvPr>
-        <p:cNvGrpSpPr/>
-        <p:nvPr/>
-      </p:nvGrpSpPr>
-      <p:grpSpPr>
-        <a:xfrm>
-          <a:off x="0" y="0"/>
-          <a:ext cx="0" cy="0"/>
-          <a:chOff x="0" y="0"/>
-          <a:chExt cx="0" cy="0"/>
-        </a:xfrm>
-      </p:grpSpPr>
-      <p:sp>
-        <p:nvSpPr>
-          <p:cNvPr id="2" name="Slide Image Placeholder 1">
-            <a:extLst>
-              <a:ext uri="{FF2B5EF4-FFF2-40B4-BE49-F238E27FC236}">
-                <a16:creationId xmlns:a16="http://schemas.microsoft.com/office/drawing/2014/main" id="{F31CC972-38D3-F2A8-4C16-894A8E232F25}"/>
-              </a:ext>
-            </a:extLst>
-          </p:cNvPr>
-          <p:cNvSpPr>
-            <a:spLocks noGrp="1" noRot="1" noChangeAspect="1"/>
-          </p:cNvSpPr>
-          <p:nvPr>
-            <p:ph type="sldImg"/>
-          </p:nvPr>
-        </p:nvSpPr>
-        <p:spPr/>
-      </p:sp>
-      <p:sp>
-        <p:nvSpPr>
-          <p:cNvPr id="3" name="Notes Placeholder 2">
-            <a:extLst>
-              <a:ext uri="{FF2B5EF4-FFF2-40B4-BE49-F238E27FC236}">
-                <a16:creationId xmlns:a16="http://schemas.microsoft.com/office/drawing/2014/main" id="{53270FB2-6C70-D5BD-BAA9-460B52DED22F}"/>
-              </a:ext>
-            </a:extLst>
-          </p:cNvPr>
-          <p:cNvSpPr>
-            <a:spLocks noGrp="1"/>
-          </p:cNvSpPr>
-          <p:nvPr>
-            <p:ph type="body" idx="1"/>
-          </p:nvPr>
-        </p:nvSpPr>
-        <p:spPr/>
-        <p:txBody>
-          <a:bodyPr/>
-          <a:lstStyle/>
-          <a:p>
-            <a:r>
-              <a:rPr lang="en-US" dirty="0"/>
-              <a:t>How could we do overall world count?</a:t>
-            </a:r>
-          </a:p>
-        </p:txBody>
-      </p:sp>
-      <p:sp>
-        <p:nvSpPr>
-          <p:cNvPr id="4" name="Slide Number Placeholder 3">
-            <a:extLst>
-              <a:ext uri="{FF2B5EF4-FFF2-40B4-BE49-F238E27FC236}">
-                <a16:creationId xmlns:a16="http://schemas.microsoft.com/office/drawing/2014/main" id="{5CA3E449-4805-F65E-FDBE-7D059EDD3C87}"/>
-              </a:ext>
-            </a:extLst>
-          </p:cNvPr>
-          <p:cNvSpPr>
-            <a:spLocks noGrp="1"/>
-          </p:cNvSpPr>
-          <p:nvPr>
-            <p:ph type="sldNum" sz="quarter" idx="5"/>
-          </p:nvPr>
-        </p:nvSpPr>
-        <p:spPr/>
-        <p:txBody>
-          <a:bodyPr/>
-          <a:lstStyle/>
-          <a:p>
-            <a:fld id="{96CC7BC8-50B2-A345-901D-1179A6286E32}" type="slidenum">
-              <a:rPr lang="en-US" smtClean="0"/>
-              <a:t>12</a:t>
-            </a:fld>
-            <a:endParaRPr lang="en-US"/>
-          </a:p>
-        </p:txBody>
-      </p:sp>
-    </p:spTree>
-    <p:extLst>
-      <p:ext uri="{BB962C8B-B14F-4D97-AF65-F5344CB8AC3E}">
-        <p14:creationId xmlns:p14="http://schemas.microsoft.com/office/powerpoint/2010/main" val="2954420720"/>
       </p:ext>
     </p:extLst>
   </p:cSld>
@@ -2398,7 +2531,7 @@
           <a:p>
             <a:fld id="{DEF5953D-26F7-4D49-AD84-4C4224623F74}" type="datetimeFigureOut">
               <a:rPr lang="en-US" smtClean="0"/>
-              <a:t>1/27/25</a:t>
+              <a:t>1/28/25</a:t>
             </a:fld>
             <a:endParaRPr lang="en-US"/>
           </a:p>
@@ -2628,7 +2761,7 @@
           <a:p>
             <a:fld id="{DEF5953D-26F7-4D49-AD84-4C4224623F74}" type="datetimeFigureOut">
               <a:rPr lang="en-US" smtClean="0"/>
-              <a:t>1/27/25</a:t>
+              <a:t>1/28/25</a:t>
             </a:fld>
             <a:endParaRPr lang="en-US"/>
           </a:p>
@@ -2863,7 +2996,7 @@
           <a:p>
             <a:fld id="{DEF5953D-26F7-4D49-AD84-4C4224623F74}" type="datetimeFigureOut">
               <a:rPr lang="en-US" smtClean="0"/>
-              <a:t>1/27/25</a:t>
+              <a:t>1/28/25</a:t>
             </a:fld>
             <a:endParaRPr lang="en-US"/>
           </a:p>
@@ -3370,7 +3503,7 @@
             <a:fld id="{DEF5953D-26F7-4D49-AD84-4C4224623F74}" type="datetimeFigureOut">
               <a:rPr lang="en-US" smtClean="0"/>
               <a:pPr/>
-              <a:t>1/27/25</a:t>
+              <a:t>1/28/25</a:t>
             </a:fld>
             <a:endParaRPr lang="en-US" dirty="0"/>
           </a:p>
@@ -3543,7 +3676,7 @@
             <a:fld id="{DEF5953D-26F7-4D49-AD84-4C4224623F74}" type="datetimeFigureOut">
               <a:rPr lang="en-US" smtClean="0"/>
               <a:pPr/>
-              <a:t>1/27/25</a:t>
+              <a:t>1/28/25</a:t>
             </a:fld>
             <a:endParaRPr lang="en-US" dirty="0"/>
           </a:p>
@@ -3968,7 +4101,7 @@
             <a:fld id="{DEF5953D-26F7-4D49-AD84-4C4224623F74}" type="datetimeFigureOut">
               <a:rPr lang="en-US" smtClean="0"/>
               <a:pPr/>
-              <a:t>1/27/25</a:t>
+              <a:t>1/28/25</a:t>
             </a:fld>
             <a:endParaRPr lang="en-US" dirty="0"/>
           </a:p>
@@ -4394,7 +4527,7 @@
           <a:p>
             <a:fld id="{DEF5953D-26F7-4D49-AD84-4C4224623F74}" type="datetimeFigureOut">
               <a:rPr lang="en-US" smtClean="0"/>
-              <a:t>1/27/25</a:t>
+              <a:t>1/28/25</a:t>
             </a:fld>
             <a:endParaRPr lang="en-US"/>
           </a:p>
@@ -4833,7 +4966,7 @@
           <a:p>
             <a:fld id="{DEF5953D-26F7-4D49-AD84-4C4224623F74}" type="datetimeFigureOut">
               <a:rPr lang="en-US" smtClean="0"/>
-              <a:t>1/27/25</a:t>
+              <a:t>1/28/25</a:t>
             </a:fld>
             <a:endParaRPr lang="en-US"/>
           </a:p>
@@ -5006,7 +5139,7 @@
           <a:p>
             <a:fld id="{DEF5953D-26F7-4D49-AD84-4C4224623F74}" type="datetimeFigureOut">
               <a:rPr lang="en-US" smtClean="0"/>
-              <a:t>1/27/25</a:t>
+              <a:t>1/28/25</a:t>
             </a:fld>
             <a:endParaRPr lang="en-US"/>
           </a:p>
@@ -5143,7 +5276,7 @@
           <a:p>
             <a:fld id="{DEF5953D-26F7-4D49-AD84-4C4224623F74}" type="datetimeFigureOut">
               <a:rPr lang="en-US" smtClean="0"/>
-              <a:t>1/27/25</a:t>
+              <a:t>1/28/25</a:t>
             </a:fld>
             <a:endParaRPr lang="en-US"/>
           </a:p>
@@ -5481,7 +5614,7 @@
           <a:p>
             <a:fld id="{DEF5953D-26F7-4D49-AD84-4C4224623F74}" type="datetimeFigureOut">
               <a:rPr lang="en-US" smtClean="0"/>
-              <a:t>1/27/25</a:t>
+              <a:t>1/28/25</a:t>
             </a:fld>
             <a:endParaRPr lang="en-US"/>
           </a:p>
@@ -5704,7 +5837,7 @@
             <a:fld id="{DEF5953D-26F7-4D49-AD84-4C4224623F74}" type="datetimeFigureOut">
               <a:rPr lang="en-US" smtClean="0"/>
               <a:pPr/>
-              <a:t>1/27/25</a:t>
+              <a:t>1/28/25</a:t>
             </a:fld>
             <a:endParaRPr lang="en-US" dirty="0"/>
           </a:p>

</xml_diff>